<commit_message>
Experiment notebook to track data and model sims
</commit_message>
<xml_diff>
--- a/soc_xsit_notebook.pptx
+++ b/soc_xsit_notebook.pptx
@@ -11,9 +11,13 @@
     <p:sldId id="264" r:id="rId5"/>
     <p:sldId id="258" r:id="rId6"/>
     <p:sldId id="259" r:id="rId7"/>
-    <p:sldId id="256" r:id="rId8"/>
-    <p:sldId id="257" r:id="rId9"/>
-    <p:sldId id="260" r:id="rId10"/>
+    <p:sldId id="266" r:id="rId8"/>
+    <p:sldId id="256" r:id="rId9"/>
+    <p:sldId id="257" r:id="rId10"/>
+    <p:sldId id="260" r:id="rId11"/>
+    <p:sldId id="268" r:id="rId12"/>
+    <p:sldId id="265" r:id="rId13"/>
+    <p:sldId id="267" r:id="rId14"/>
   </p:sldIdLst>
   <p:sldSz cx="9144000" cy="6858000" type="screen4x3"/>
   <p:notesSz cx="6858000" cy="9144000"/>
@@ -3120,7 +3124,7 @@
           <a:p>
             <a:r>
               <a:rPr lang="en-US" dirty="0" smtClean="0"/>
-              <a:t>XSIT_SOC</a:t>
+              <a:t>SOC_XSIT</a:t>
             </a:r>
             <a:endParaRPr lang="en-US" dirty="0"/>
           </a:p>
@@ -3130,6 +3134,399 @@
     <p:extLst>
       <p:ext uri="{BB962C8B-B14F-4D97-AF65-F5344CB8AC3E}">
         <p14:creationId xmlns:p14="http://schemas.microsoft.com/office/powerpoint/2010/main" val="3056625130"/>
+      </p:ext>
+    </p:extLst>
+  </p:cSld>
+  <p:clrMapOvr>
+    <a:masterClrMapping/>
+  </p:clrMapOvr>
+</p:sld>
+</file>
+
+<file path=ppt/slides/slide10.xml><?xml version="1.0" encoding="utf-8"?>
+<p:sld xmlns:a="http://schemas.openxmlformats.org/drawingml/2006/main" xmlns:r="http://schemas.openxmlformats.org/officeDocument/2006/relationships" xmlns:p="http://schemas.openxmlformats.org/presentationml/2006/main">
+  <p:cSld>
+    <p:spTree>
+      <p:nvGrpSpPr>
+        <p:cNvPr id="1" name=""/>
+        <p:cNvGrpSpPr/>
+        <p:nvPr/>
+      </p:nvGrpSpPr>
+      <p:grpSpPr>
+        <a:xfrm>
+          <a:off x="0" y="0"/>
+          <a:ext cx="0" cy="0"/>
+          <a:chOff x="0" y="0"/>
+          <a:chExt cx="0" cy="0"/>
+        </a:xfrm>
+      </p:grpSpPr>
+      <p:sp>
+        <p:nvSpPr>
+          <p:cNvPr id="2" name="Title 1"/>
+          <p:cNvSpPr>
+            <a:spLocks noGrp="1"/>
+          </p:cNvSpPr>
+          <p:nvPr>
+            <p:ph type="title"/>
+          </p:nvPr>
+        </p:nvSpPr>
+        <p:spPr/>
+        <p:txBody>
+          <a:bodyPr/>
+          <a:lstStyle/>
+          <a:p>
+            <a:r>
+              <a:rPr lang="en-US" dirty="0" smtClean="0"/>
+              <a:t>How about gamma?</a:t>
+            </a:r>
+            <a:endParaRPr lang="en-US" dirty="0"/>
+          </a:p>
+        </p:txBody>
+      </p:sp>
+      <p:pic>
+        <p:nvPicPr>
+          <p:cNvPr id="3" name="Picture 2" descr="Rplot.pdf"/>
+          <p:cNvPicPr>
+            <a:picLocks noChangeAspect="1"/>
+          </p:cNvPicPr>
+          <p:nvPr/>
+        </p:nvPicPr>
+        <p:blipFill>
+          <a:blip r:embed="rId2">
+            <a:extLst>
+              <a:ext uri="{28A0092B-C50C-407E-A947-70E740481C1C}">
+                <a14:useLocalDpi xmlns:a14="http://schemas.microsoft.com/office/drawing/2010/main" val="0"/>
+              </a:ext>
+            </a:extLst>
+          </a:blip>
+          <a:stretch>
+            <a:fillRect/>
+          </a:stretch>
+        </p:blipFill>
+        <p:spPr>
+          <a:xfrm>
+            <a:off x="763616" y="4390434"/>
+            <a:ext cx="2895600" cy="2286000"/>
+          </a:xfrm>
+          <a:prstGeom prst="rect">
+            <a:avLst/>
+          </a:prstGeom>
+        </p:spPr>
+      </p:pic>
+      <p:pic>
+        <p:nvPicPr>
+          <p:cNvPr id="5" name="Picture 4" descr="Screen Shot 2014-03-28 at 10.26.55 AM.png"/>
+          <p:cNvPicPr>
+            <a:picLocks noChangeAspect="1"/>
+          </p:cNvPicPr>
+          <p:nvPr/>
+        </p:nvPicPr>
+        <p:blipFill>
+          <a:blip r:embed="rId3">
+            <a:extLst>
+              <a:ext uri="{28A0092B-C50C-407E-A947-70E740481C1C}">
+                <a14:useLocalDpi xmlns:a14="http://schemas.microsoft.com/office/drawing/2010/main" val="0"/>
+              </a:ext>
+            </a:extLst>
+          </a:blip>
+          <a:stretch>
+            <a:fillRect/>
+          </a:stretch>
+        </p:blipFill>
+        <p:spPr>
+          <a:xfrm>
+            <a:off x="565856" y="1481668"/>
+            <a:ext cx="5346699" cy="2897187"/>
+          </a:xfrm>
+          <a:prstGeom prst="rect">
+            <a:avLst/>
+          </a:prstGeom>
+        </p:spPr>
+      </p:pic>
+      <p:sp>
+        <p:nvSpPr>
+          <p:cNvPr id="6" name="TextBox 5"/>
+          <p:cNvSpPr txBox="1"/>
+          <p:nvPr/>
+        </p:nvSpPr>
+        <p:spPr>
+          <a:xfrm>
+            <a:off x="5298648" y="4576562"/>
+            <a:ext cx="785191" cy="584776"/>
+          </a:xfrm>
+          <a:prstGeom prst="rect">
+            <a:avLst/>
+          </a:prstGeom>
+          <a:noFill/>
+        </p:spPr>
+        <p:txBody>
+          <a:bodyPr wrap="none" rtlCol="0">
+            <a:spAutoFit/>
+          </a:bodyPr>
+          <a:lstStyle/>
+          <a:p>
+            <a:r>
+              <a:rPr lang="en-US" sz="3200" b="1" dirty="0" smtClean="0"/>
+              <a:t>No.</a:t>
+            </a:r>
+            <a:endParaRPr lang="en-US" sz="3200" b="1" dirty="0"/>
+          </a:p>
+        </p:txBody>
+      </p:sp>
+    </p:spTree>
+    <p:extLst>
+      <p:ext uri="{BB962C8B-B14F-4D97-AF65-F5344CB8AC3E}">
+        <p14:creationId xmlns:p14="http://schemas.microsoft.com/office/powerpoint/2010/main" val="3842177645"/>
+      </p:ext>
+    </p:extLst>
+  </p:cSld>
+  <p:clrMapOvr>
+    <a:masterClrMapping/>
+  </p:clrMapOvr>
+</p:sld>
+</file>
+
+<file path=ppt/slides/slide11.xml><?xml version="1.0" encoding="utf-8"?>
+<p:sld xmlns:a="http://schemas.openxmlformats.org/drawingml/2006/main" xmlns:r="http://schemas.openxmlformats.org/officeDocument/2006/relationships" xmlns:p="http://schemas.openxmlformats.org/presentationml/2006/main">
+  <p:cSld>
+    <p:spTree>
+      <p:nvGrpSpPr>
+        <p:cNvPr id="1" name=""/>
+        <p:cNvGrpSpPr/>
+        <p:nvPr/>
+      </p:nvGrpSpPr>
+      <p:grpSpPr>
+        <a:xfrm>
+          <a:off x="0" y="0"/>
+          <a:ext cx="0" cy="0"/>
+          <a:chOff x="0" y="0"/>
+          <a:chExt cx="0" cy="0"/>
+        </a:xfrm>
+      </p:grpSpPr>
+      <p:sp>
+        <p:nvSpPr>
+          <p:cNvPr id="2" name="Title 1"/>
+          <p:cNvSpPr>
+            <a:spLocks noGrp="1"/>
+          </p:cNvSpPr>
+          <p:nvPr>
+            <p:ph type="title"/>
+          </p:nvPr>
+        </p:nvSpPr>
+        <p:spPr/>
+        <p:txBody>
+          <a:bodyPr/>
+          <a:lstStyle/>
+          <a:p>
+            <a:r>
+              <a:rPr lang="en-US" dirty="0" smtClean="0"/>
+              <a:t>How about </a:t>
+            </a:r>
+            <a:r>
+              <a:rPr lang="en-US" dirty="0" smtClean="0"/>
+              <a:t>?</a:t>
+            </a:r>
+            <a:endParaRPr lang="en-US" dirty="0"/>
+          </a:p>
+        </p:txBody>
+      </p:sp>
+      <p:pic>
+        <p:nvPicPr>
+          <p:cNvPr id="3" name="Picture 2" descr="Rplot.pdf"/>
+          <p:cNvPicPr>
+            <a:picLocks noChangeAspect="1"/>
+          </p:cNvPicPr>
+          <p:nvPr/>
+        </p:nvPicPr>
+        <p:blipFill>
+          <a:blip r:embed="rId2">
+            <a:extLst>
+              <a:ext uri="{28A0092B-C50C-407E-A947-70E740481C1C}">
+                <a14:useLocalDpi xmlns:a14="http://schemas.microsoft.com/office/drawing/2010/main" val="0"/>
+              </a:ext>
+            </a:extLst>
+          </a:blip>
+          <a:stretch>
+            <a:fillRect/>
+          </a:stretch>
+        </p:blipFill>
+        <p:spPr>
+          <a:xfrm>
+            <a:off x="763616" y="4390434"/>
+            <a:ext cx="2895600" cy="2286000"/>
+          </a:xfrm>
+          <a:prstGeom prst="rect">
+            <a:avLst/>
+          </a:prstGeom>
+        </p:spPr>
+      </p:pic>
+    </p:spTree>
+    <p:extLst>
+      <p:ext uri="{BB962C8B-B14F-4D97-AF65-F5344CB8AC3E}">
+        <p14:creationId xmlns:p14="http://schemas.microsoft.com/office/powerpoint/2010/main" val="3835440338"/>
+      </p:ext>
+    </p:extLst>
+  </p:cSld>
+  <p:clrMapOvr>
+    <a:masterClrMapping/>
+  </p:clrMapOvr>
+</p:sld>
+</file>
+
+<file path=ppt/slides/slide12.xml><?xml version="1.0" encoding="utf-8"?>
+<p:sld xmlns:a="http://schemas.openxmlformats.org/drawingml/2006/main" xmlns:r="http://schemas.openxmlformats.org/officeDocument/2006/relationships" xmlns:p="http://schemas.openxmlformats.org/presentationml/2006/main">
+  <p:cSld>
+    <p:spTree>
+      <p:nvGrpSpPr>
+        <p:cNvPr id="1" name=""/>
+        <p:cNvGrpSpPr/>
+        <p:nvPr/>
+      </p:nvGrpSpPr>
+      <p:grpSpPr>
+        <a:xfrm>
+          <a:off x="0" y="0"/>
+          <a:ext cx="0" cy="0"/>
+          <a:chOff x="0" y="0"/>
+          <a:chExt cx="0" cy="0"/>
+        </a:xfrm>
+      </p:grpSpPr>
+      <p:sp>
+        <p:nvSpPr>
+          <p:cNvPr id="2" name="Title 1"/>
+          <p:cNvSpPr>
+            <a:spLocks noGrp="1"/>
+          </p:cNvSpPr>
+          <p:nvPr>
+            <p:ph type="title"/>
+          </p:nvPr>
+        </p:nvSpPr>
+        <p:spPr/>
+        <p:txBody>
+          <a:bodyPr>
+            <a:normAutofit/>
+          </a:bodyPr>
+          <a:lstStyle/>
+          <a:p>
+            <a:r>
+              <a:rPr lang="en-US" dirty="0" smtClean="0"/>
+              <a:t>Experiment 2: Replication </a:t>
+            </a:r>
+            <a:endParaRPr lang="en-US" dirty="0"/>
+          </a:p>
+        </p:txBody>
+      </p:sp>
+      <p:sp>
+        <p:nvSpPr>
+          <p:cNvPr id="3" name="Content Placeholder 2"/>
+          <p:cNvSpPr>
+            <a:spLocks noGrp="1"/>
+          </p:cNvSpPr>
+          <p:nvPr>
+            <p:ph idx="1"/>
+          </p:nvPr>
+        </p:nvSpPr>
+        <p:spPr/>
+        <p:txBody>
+          <a:bodyPr/>
+          <a:lstStyle/>
+          <a:p>
+            <a:r>
+              <a:rPr lang="en-US" dirty="0" smtClean="0"/>
+              <a:t>Replication of three-way interaction </a:t>
+            </a:r>
+          </a:p>
+          <a:p>
+            <a:r>
+              <a:rPr lang="en-US" dirty="0" smtClean="0"/>
+              <a:t>Included more interval conditions</a:t>
+            </a:r>
+          </a:p>
+          <a:p>
+            <a:pPr lvl="1"/>
+            <a:r>
+              <a:rPr lang="en-US" dirty="0" smtClean="0"/>
+              <a:t>0, 1, 3, 7</a:t>
+            </a:r>
+            <a:endParaRPr lang="en-US" dirty="0"/>
+          </a:p>
+        </p:txBody>
+      </p:sp>
+    </p:spTree>
+    <p:extLst>
+      <p:ext uri="{BB962C8B-B14F-4D97-AF65-F5344CB8AC3E}">
+        <p14:creationId xmlns:p14="http://schemas.microsoft.com/office/powerpoint/2010/main" val="2489209628"/>
+      </p:ext>
+    </p:extLst>
+  </p:cSld>
+  <p:clrMapOvr>
+    <a:masterClrMapping/>
+  </p:clrMapOvr>
+</p:sld>
+</file>
+
+<file path=ppt/slides/slide13.xml><?xml version="1.0" encoding="utf-8"?>
+<p:sld xmlns:a="http://schemas.openxmlformats.org/drawingml/2006/main" xmlns:r="http://schemas.openxmlformats.org/officeDocument/2006/relationships" xmlns:p="http://schemas.openxmlformats.org/presentationml/2006/main">
+  <p:cSld>
+    <p:spTree>
+      <p:nvGrpSpPr>
+        <p:cNvPr id="1" name=""/>
+        <p:cNvGrpSpPr/>
+        <p:nvPr/>
+      </p:nvGrpSpPr>
+      <p:grpSpPr>
+        <a:xfrm>
+          <a:off x="0" y="0"/>
+          <a:ext cx="0" cy="0"/>
+          <a:chOff x="0" y="0"/>
+          <a:chExt cx="0" cy="0"/>
+        </a:xfrm>
+      </p:grpSpPr>
+      <p:sp>
+        <p:nvSpPr>
+          <p:cNvPr id="2" name="Title 1"/>
+          <p:cNvSpPr>
+            <a:spLocks noGrp="1"/>
+          </p:cNvSpPr>
+          <p:nvPr>
+            <p:ph type="title"/>
+          </p:nvPr>
+        </p:nvSpPr>
+        <p:spPr/>
+        <p:txBody>
+          <a:bodyPr/>
+          <a:lstStyle/>
+          <a:p>
+            <a:r>
+              <a:rPr lang="en-US" dirty="0" smtClean="0"/>
+              <a:t>Experiment 2 data</a:t>
+            </a:r>
+            <a:endParaRPr lang="en-US" dirty="0"/>
+          </a:p>
+        </p:txBody>
+      </p:sp>
+      <p:sp>
+        <p:nvSpPr>
+          <p:cNvPr id="3" name="Content Placeholder 2"/>
+          <p:cNvSpPr>
+            <a:spLocks noGrp="1"/>
+          </p:cNvSpPr>
+          <p:nvPr>
+            <p:ph idx="1"/>
+          </p:nvPr>
+        </p:nvSpPr>
+        <p:spPr/>
+        <p:txBody>
+          <a:bodyPr/>
+          <a:lstStyle/>
+          <a:p>
+            <a:endParaRPr lang="en-US" dirty="0"/>
+          </a:p>
+        </p:txBody>
+      </p:sp>
+    </p:spTree>
+    <p:extLst>
+      <p:ext uri="{BB962C8B-B14F-4D97-AF65-F5344CB8AC3E}">
+        <p14:creationId xmlns:p14="http://schemas.microsoft.com/office/powerpoint/2010/main" val="2526878371"/>
       </p:ext>
     </p:extLst>
   </p:cSld>
@@ -3196,7 +3593,49 @@
           <a:p>
             <a:r>
               <a:rPr lang="en-US" dirty="0" smtClean="0"/>
-              <a:t>methods</a:t>
+              <a:t>Methods</a:t>
+            </a:r>
+          </a:p>
+          <a:p>
+            <a:pPr lvl="1"/>
+            <a:r>
+              <a:rPr lang="en-US" dirty="0" smtClean="0"/>
+              <a:t>Adapt Dan’s </a:t>
+            </a:r>
+            <a:r>
+              <a:rPr lang="en-US" dirty="0" err="1" smtClean="0"/>
+              <a:t>xsit</a:t>
+            </a:r>
+            <a:r>
+              <a:rPr lang="en-US" dirty="0" err="1" smtClean="0"/>
+              <a:t>_min</a:t>
+            </a:r>
+            <a:r>
+              <a:rPr lang="en-US" dirty="0" smtClean="0"/>
+              <a:t> paradigm to include social cue to reference during exposure trials </a:t>
+            </a:r>
+            <a:endParaRPr lang="en-US" dirty="0" smtClean="0"/>
+          </a:p>
+          <a:p>
+            <a:pPr lvl="1"/>
+            <a:r>
+              <a:rPr lang="en-US" dirty="0" smtClean="0"/>
+              <a:t>4 referents </a:t>
+            </a:r>
+            <a:r>
+              <a:rPr lang="en-US" dirty="0" smtClean="0">
+                <a:sym typeface="Wingdings"/>
+              </a:rPr>
+              <a:t> chosen because this is where we might see the biggest difference between social and no-social </a:t>
+            </a:r>
+          </a:p>
+          <a:p>
+            <a:pPr lvl="1"/>
+            <a:r>
+              <a:rPr lang="en-US" dirty="0" smtClean="0">
+                <a:sym typeface="Wingdings"/>
+              </a:rPr>
+              <a:t>0 intervening words  chose simplest interval condition</a:t>
             </a:r>
             <a:endParaRPr lang="en-US" dirty="0"/>
           </a:p>
@@ -3520,6 +3959,36 @@
           </a:prstGeom>
         </p:spPr>
       </p:pic>
+      <p:sp>
+        <p:nvSpPr>
+          <p:cNvPr id="4" name="TextBox 3"/>
+          <p:cNvSpPr txBox="1"/>
+          <p:nvPr/>
+        </p:nvSpPr>
+        <p:spPr>
+          <a:xfrm>
+            <a:off x="5263444" y="5559775"/>
+            <a:ext cx="3423356" cy="646331"/>
+          </a:xfrm>
+          <a:prstGeom prst="rect">
+            <a:avLst/>
+          </a:prstGeom>
+          <a:noFill/>
+        </p:spPr>
+        <p:txBody>
+          <a:bodyPr wrap="square" rtlCol="0">
+            <a:spAutoFit/>
+          </a:bodyPr>
+          <a:lstStyle/>
+          <a:p>
+            <a:r>
+              <a:rPr lang="en-US" dirty="0" smtClean="0"/>
+              <a:t>Three way interaction between condition, trial type, and interval</a:t>
+            </a:r>
+            <a:endParaRPr lang="en-US" dirty="0"/>
+          </a:p>
+        </p:txBody>
+      </p:sp>
     </p:spTree>
     <p:extLst>
       <p:ext uri="{BB962C8B-B14F-4D97-AF65-F5344CB8AC3E}">
@@ -3585,7 +4054,7 @@
           </p:cNvPicPr>
           <p:nvPr/>
         </p:nvPicPr>
-        <p:blipFill>
+        <p:blipFill rotWithShape="1">
           <a:blip r:embed="rId2">
             <a:extLst>
               <a:ext uri="{28A0092B-C50C-407E-A947-70E740481C1C}">
@@ -3593,14 +4062,13 @@
               </a:ext>
             </a:extLst>
           </a:blip>
-          <a:stretch>
-            <a:fillRect/>
-          </a:stretch>
+          <a:srcRect r="9137"/>
+          <a:stretch/>
         </p:blipFill>
         <p:spPr>
           <a:xfrm>
             <a:off x="2940145" y="1119352"/>
-            <a:ext cx="6827674" cy="5390270"/>
+            <a:ext cx="6203855" cy="5390270"/>
           </a:xfrm>
           <a:prstGeom prst="rect">
             <a:avLst/>
@@ -3677,6 +4145,212 @@
           <a:chExt cx="0" cy="0"/>
         </a:xfrm>
       </p:grpSpPr>
+      <p:sp>
+        <p:nvSpPr>
+          <p:cNvPr id="2" name="Title 1"/>
+          <p:cNvSpPr>
+            <a:spLocks noGrp="1"/>
+          </p:cNvSpPr>
+          <p:nvPr>
+            <p:ph type="title"/>
+          </p:nvPr>
+        </p:nvSpPr>
+        <p:spPr/>
+        <p:txBody>
+          <a:bodyPr/>
+          <a:lstStyle/>
+          <a:p>
+            <a:r>
+              <a:rPr lang="en-US" dirty="0" smtClean="0"/>
+              <a:t>Model</a:t>
+            </a:r>
+            <a:endParaRPr lang="en-US" dirty="0"/>
+          </a:p>
+        </p:txBody>
+      </p:sp>
+      <p:sp>
+        <p:nvSpPr>
+          <p:cNvPr id="3" name="Content Placeholder 2"/>
+          <p:cNvSpPr>
+            <a:spLocks noGrp="1"/>
+          </p:cNvSpPr>
+          <p:nvPr>
+            <p:ph idx="1"/>
+          </p:nvPr>
+        </p:nvSpPr>
+        <p:spPr>
+          <a:xfrm>
+            <a:off x="457200" y="1600200"/>
+            <a:ext cx="8489244" cy="4525963"/>
+          </a:xfrm>
+        </p:spPr>
+        <p:txBody>
+          <a:bodyPr>
+            <a:normAutofit fontScale="85000" lnSpcReduction="10000"/>
+          </a:bodyPr>
+          <a:lstStyle/>
+          <a:p>
+            <a:r>
+              <a:rPr lang="en-US" b="1" dirty="0" err="1" smtClean="0"/>
+              <a:t>same_trial_strength</a:t>
+            </a:r>
+            <a:r>
+              <a:rPr lang="en-US" dirty="0" smtClean="0"/>
+              <a:t> </a:t>
+            </a:r>
+            <a:r>
+              <a:rPr lang="en-US" dirty="0"/>
+              <a:t>&lt;- gamma * sigma * (int+1)^-lambda</a:t>
+            </a:r>
+          </a:p>
+          <a:p>
+            <a:r>
+              <a:rPr lang="en-US" b="1" dirty="0" err="1" smtClean="0"/>
+              <a:t>switch_trial_strength</a:t>
+            </a:r>
+            <a:r>
+              <a:rPr lang="en-US" dirty="0" smtClean="0"/>
+              <a:t> </a:t>
+            </a:r>
+            <a:r>
+              <a:rPr lang="en-US" dirty="0"/>
+              <a:t>&lt;- gamma * ((1-sigma) / (numPic-1))*(int+1)^-</a:t>
+            </a:r>
+            <a:r>
+              <a:rPr lang="en-US" dirty="0" smtClean="0"/>
+              <a:t>lambda</a:t>
+            </a:r>
+          </a:p>
+          <a:p>
+            <a:endParaRPr lang="en-US" dirty="0"/>
+          </a:p>
+          <a:p>
+            <a:r>
+              <a:rPr lang="en-US" dirty="0"/>
+              <a:t>gamma=1.5,  # strength of initial encoding</a:t>
+            </a:r>
+          </a:p>
+          <a:p>
+            <a:r>
+              <a:rPr lang="en-US" dirty="0" smtClean="0"/>
+              <a:t>lambda</a:t>
+            </a:r>
+            <a:r>
+              <a:rPr lang="en-US" dirty="0"/>
+              <a:t>=.15, </a:t>
+            </a:r>
+            <a:r>
+              <a:rPr lang="en-US" dirty="0" smtClean="0"/>
+              <a:t> # </a:t>
+            </a:r>
+            <a:r>
+              <a:rPr lang="en-US" dirty="0"/>
+              <a:t>rate of memory decay </a:t>
+            </a:r>
+          </a:p>
+          <a:p>
+            <a:r>
+              <a:rPr lang="en-US" dirty="0" smtClean="0"/>
+              <a:t>sigma</a:t>
+            </a:r>
+            <a:r>
+              <a:rPr lang="en-US" dirty="0"/>
+              <a:t>=.5,   </a:t>
+            </a:r>
+            <a:r>
+              <a:rPr lang="en-US" dirty="0" smtClean="0"/>
+              <a:t>    # </a:t>
+            </a:r>
+            <a:r>
+              <a:rPr lang="en-US" dirty="0"/>
+              <a:t>amount of </a:t>
+            </a:r>
+            <a:r>
+              <a:rPr lang="en-US" dirty="0" smtClean="0"/>
+              <a:t>intention to </a:t>
+            </a:r>
+            <a:r>
+              <a:rPr lang="en-US" dirty="0"/>
+              <a:t>initial hypothesis </a:t>
+            </a:r>
+          </a:p>
+          <a:p>
+            <a:r>
+              <a:rPr lang="en-US" dirty="0" err="1" smtClean="0"/>
+              <a:t>numPic</a:t>
+            </a:r>
+            <a:r>
+              <a:rPr lang="en-US" dirty="0" smtClean="0"/>
+              <a:t>=</a:t>
+            </a:r>
+            <a:r>
+              <a:rPr lang="en-US" dirty="0"/>
+              <a:t>4,  </a:t>
+            </a:r>
+            <a:r>
+              <a:rPr lang="en-US" dirty="0" smtClean="0"/>
+              <a:t>   </a:t>
+            </a:r>
+            <a:r>
+              <a:rPr lang="en-US" dirty="0"/>
+              <a:t># number of intervening words</a:t>
+            </a:r>
+          </a:p>
+          <a:p>
+            <a:r>
+              <a:rPr lang="en-US" dirty="0" err="1" smtClean="0"/>
+              <a:t>int</a:t>
+            </a:r>
+            <a:r>
+              <a:rPr lang="en-US" dirty="0"/>
+              <a:t>=</a:t>
+            </a:r>
+            <a:r>
+              <a:rPr lang="en-US" dirty="0" smtClean="0"/>
+              <a:t>0               </a:t>
+            </a:r>
+            <a:r>
+              <a:rPr lang="en-US" dirty="0"/>
+              <a:t># number of </a:t>
+            </a:r>
+            <a:r>
+              <a:rPr lang="en-US" dirty="0" err="1"/>
+              <a:t>pics</a:t>
+            </a:r>
+            <a:endParaRPr lang="en-US" dirty="0"/>
+          </a:p>
+        </p:txBody>
+      </p:sp>
+    </p:spTree>
+    <p:extLst>
+      <p:ext uri="{BB962C8B-B14F-4D97-AF65-F5344CB8AC3E}">
+        <p14:creationId xmlns:p14="http://schemas.microsoft.com/office/powerpoint/2010/main" val="1351473915"/>
+      </p:ext>
+    </p:extLst>
+  </p:cSld>
+  <p:clrMapOvr>
+    <a:masterClrMapping/>
+  </p:clrMapOvr>
+</p:sld>
+</file>
+
+<file path=ppt/slides/slide8.xml><?xml version="1.0" encoding="utf-8"?>
+<p:sld xmlns:a="http://schemas.openxmlformats.org/drawingml/2006/main" xmlns:r="http://schemas.openxmlformats.org/officeDocument/2006/relationships" xmlns:p="http://schemas.openxmlformats.org/presentationml/2006/main">
+  <p:cSld>
+    <p:spTree>
+      <p:nvGrpSpPr>
+        <p:cNvPr id="1" name=""/>
+        <p:cNvGrpSpPr/>
+        <p:nvPr/>
+      </p:nvGrpSpPr>
+      <p:grpSpPr>
+        <a:xfrm>
+          <a:off x="0" y="0"/>
+          <a:ext cx="0" cy="0"/>
+          <a:chOff x="0" y="0"/>
+          <a:chExt cx="0" cy="0"/>
+        </a:xfrm>
+      </p:grpSpPr>
       <p:pic>
         <p:nvPicPr>
           <p:cNvPr id="5" name="Picture 4" descr="vary sigma.pdf"/>
@@ -3805,7 +4479,7 @@
 </p:sld>
 </file>
 
-<file path=ppt/slides/slide8.xml><?xml version="1.0" encoding="utf-8"?>
+<file path=ppt/slides/slide9.xml><?xml version="1.0" encoding="utf-8"?>
 <p:sld xmlns:a="http://schemas.openxmlformats.org/drawingml/2006/main" xmlns:r="http://schemas.openxmlformats.org/officeDocument/2006/relationships" xmlns:p="http://schemas.openxmlformats.org/presentationml/2006/main">
   <p:cSld>
     <p:spTree>
@@ -3907,69 +4581,16 @@
           </a:p>
         </p:txBody>
       </p:sp>
-    </p:spTree>
-    <p:extLst>
-      <p:ext uri="{BB962C8B-B14F-4D97-AF65-F5344CB8AC3E}">
-        <p14:creationId xmlns:p14="http://schemas.microsoft.com/office/powerpoint/2010/main" val="281043180"/>
-      </p:ext>
-    </p:extLst>
-  </p:cSld>
-  <p:clrMapOvr>
-    <a:masterClrMapping/>
-  </p:clrMapOvr>
-</p:sld>
-</file>
-
-<file path=ppt/slides/slide9.xml><?xml version="1.0" encoding="utf-8"?>
-<p:sld xmlns:a="http://schemas.openxmlformats.org/drawingml/2006/main" xmlns:r="http://schemas.openxmlformats.org/officeDocument/2006/relationships" xmlns:p="http://schemas.openxmlformats.org/presentationml/2006/main">
-  <p:cSld>
-    <p:spTree>
-      <p:nvGrpSpPr>
-        <p:cNvPr id="1" name=""/>
-        <p:cNvGrpSpPr/>
-        <p:nvPr/>
-      </p:nvGrpSpPr>
-      <p:grpSpPr>
-        <a:xfrm>
-          <a:off x="0" y="0"/>
-          <a:ext cx="0" cy="0"/>
-          <a:chOff x="0" y="0"/>
-          <a:chExt cx="0" cy="0"/>
-        </a:xfrm>
-      </p:grpSpPr>
-      <p:sp>
-        <p:nvSpPr>
-          <p:cNvPr id="2" name="Title 1"/>
-          <p:cNvSpPr>
-            <a:spLocks noGrp="1"/>
-          </p:cNvSpPr>
-          <p:nvPr>
-            <p:ph type="title"/>
-          </p:nvPr>
-        </p:nvSpPr>
-        <p:spPr/>
-        <p:txBody>
-          <a:bodyPr/>
-          <a:lstStyle/>
-          <a:p>
-            <a:r>
-              <a:rPr lang="en-US" dirty="0" smtClean="0"/>
-              <a:t>How about gamma?</a:t>
-            </a:r>
-            <a:endParaRPr lang="en-US" dirty="0"/>
-          </a:p>
-        </p:txBody>
-      </p:sp>
       <p:pic>
         <p:nvPicPr>
-          <p:cNvPr id="3" name="Picture 2" descr="Rplot.pdf"/>
+          <p:cNvPr id="10" name="Picture 9" descr="Screen Shot 2014-03-28 at 10.13.24 AM.png"/>
           <p:cNvPicPr>
             <a:picLocks noChangeAspect="1"/>
           </p:cNvPicPr>
           <p:nvPr/>
         </p:nvPicPr>
         <p:blipFill>
-          <a:blip r:embed="rId2">
+          <a:blip r:embed="rId3">
             <a:extLst>
               <a:ext uri="{28A0092B-C50C-407E-A947-70E740481C1C}">
                 <a14:useLocalDpi xmlns:a14="http://schemas.microsoft.com/office/drawing/2010/main" val="0"/>
@@ -3982,8 +4603,8 @@
         </p:blipFill>
         <p:spPr>
           <a:xfrm>
-            <a:off x="763616" y="4390434"/>
-            <a:ext cx="2895600" cy="2286000"/>
+            <a:off x="550329" y="1417638"/>
+            <a:ext cx="5263449" cy="3000550"/>
           </a:xfrm>
           <a:prstGeom prst="rect">
             <a:avLst/>
@@ -3993,7 +4614,7 @@
     </p:spTree>
     <p:extLst>
       <p:ext uri="{BB962C8B-B14F-4D97-AF65-F5344CB8AC3E}">
-        <p14:creationId xmlns:p14="http://schemas.microsoft.com/office/powerpoint/2010/main" val="3842177645"/>
+        <p14:creationId xmlns:p14="http://schemas.microsoft.com/office/powerpoint/2010/main" val="281043180"/>
       </p:ext>
     </p:extLst>
   </p:cSld>

</xml_diff>